<commit_message>
updated project status for 2017/12/01
</commit_message>
<xml_diff>
--- a/Document/CNTK_Project_Status_20171201.pptx
+++ b/Document/CNTK_Project_Status_20171201.pptx
@@ -5,17 +5,19 @@
     <p:sldMasterId id="2147483648" r:id="rId1"/>
   </p:sldMasterIdLst>
   <p:notesMasterIdLst>
-    <p:notesMasterId r:id="rId10"/>
+    <p:notesMasterId r:id="rId12"/>
   </p:notesMasterIdLst>
   <p:sldIdLst>
     <p:sldId id="256" r:id="rId2"/>
     <p:sldId id="257" r:id="rId3"/>
-    <p:sldId id="268" r:id="rId4"/>
-    <p:sldId id="271" r:id="rId5"/>
-    <p:sldId id="272" r:id="rId6"/>
-    <p:sldId id="269" r:id="rId7"/>
-    <p:sldId id="270" r:id="rId8"/>
-    <p:sldId id="258" r:id="rId9"/>
+    <p:sldId id="274" r:id="rId4"/>
+    <p:sldId id="275" r:id="rId5"/>
+    <p:sldId id="271" r:id="rId6"/>
+    <p:sldId id="272" r:id="rId7"/>
+    <p:sldId id="276" r:id="rId8"/>
+    <p:sldId id="269" r:id="rId9"/>
+    <p:sldId id="270" r:id="rId10"/>
+    <p:sldId id="277" r:id="rId11"/>
   </p:sldIdLst>
   <p:sldSz cx="12192000" cy="6858000"/>
   <p:notesSz cx="6858000" cy="9144000"/>
@@ -122,6 +124,1066 @@
 </p:presentation>
 </file>
 
+<file path=ppt/charts/chart1.xml><?xml version="1.0" encoding="utf-8"?>
+<c:chartSpace xmlns:c="http://schemas.openxmlformats.org/drawingml/2006/chart" xmlns:a="http://schemas.openxmlformats.org/drawingml/2006/main" xmlns:r="http://schemas.openxmlformats.org/officeDocument/2006/relationships" xmlns:c16r2="http://schemas.microsoft.com/office/drawing/2015/06/chart">
+  <c:date1904 val="0"/>
+  <c:lang val="en-US"/>
+  <c:roundedCorners val="0"/>
+  <mc:AlternateContent xmlns:mc="http://schemas.openxmlformats.org/markup-compatibility/2006">
+    <mc:Choice xmlns:c14="http://schemas.microsoft.com/office/drawing/2007/8/2/chart" Requires="c14">
+      <c14:style val="102"/>
+    </mc:Choice>
+    <mc:Fallback>
+      <c:style val="2"/>
+    </mc:Fallback>
+  </mc:AlternateContent>
+  <c:chart>
+    <c:title>
+      <c:tx>
+        <c:rich>
+          <a:bodyPr rot="0" spcFirstLastPara="1" vertOverflow="ellipsis" vert="horz" wrap="square" anchor="ctr" anchorCtr="1"/>
+          <a:lstStyle/>
+          <a:p>
+            <a:pPr>
+              <a:defRPr sz="1600" b="1" i="0" u="none" strike="noStrike" kern="1200" cap="none" spc="0" normalizeH="0" baseline="0">
+                <a:solidFill>
+                  <a:schemeClr val="dk1">
+                    <a:lumMod val="50000"/>
+                    <a:lumOff val="50000"/>
+                  </a:schemeClr>
+                </a:solidFill>
+                <a:latin typeface="+mj-lt"/>
+                <a:ea typeface="+mj-ea"/>
+                <a:cs typeface="+mj-cs"/>
+              </a:defRPr>
+            </a:pPr>
+            <a:r>
+              <a:rPr lang="en-US"/>
+              <a:t>Pre-trained Models Correction Rate</a:t>
+            </a:r>
+          </a:p>
+        </c:rich>
+      </c:tx>
+      <c:layout/>
+      <c:overlay val="0"/>
+      <c:spPr>
+        <a:noFill/>
+        <a:ln>
+          <a:noFill/>
+        </a:ln>
+        <a:effectLst/>
+      </c:spPr>
+      <c:txPr>
+        <a:bodyPr rot="0" spcFirstLastPara="1" vertOverflow="ellipsis" vert="horz" wrap="square" anchor="ctr" anchorCtr="1"/>
+        <a:lstStyle/>
+        <a:p>
+          <a:pPr>
+            <a:defRPr sz="1600" b="1" i="0" u="none" strike="noStrike" kern="1200" cap="none" spc="0" normalizeH="0" baseline="0">
+              <a:solidFill>
+                <a:schemeClr val="dk1">
+                  <a:lumMod val="50000"/>
+                  <a:lumOff val="50000"/>
+                </a:schemeClr>
+              </a:solidFill>
+              <a:latin typeface="+mj-lt"/>
+              <a:ea typeface="+mj-ea"/>
+              <a:cs typeface="+mj-cs"/>
+            </a:defRPr>
+          </a:pPr>
+          <a:endParaRPr lang="en-US"/>
+        </a:p>
+      </c:txPr>
+    </c:title>
+    <c:autoTitleDeleted val="0"/>
+    <c:plotArea>
+      <c:layout/>
+      <c:barChart>
+        <c:barDir val="col"/>
+        <c:grouping val="clustered"/>
+        <c:varyColors val="0"/>
+        <c:ser>
+          <c:idx val="0"/>
+          <c:order val="0"/>
+          <c:tx>
+            <c:strRef>
+              <c:f>Sheet1!$C$3</c:f>
+              <c:strCache>
+                <c:ptCount val="1"/>
+                <c:pt idx="0">
+                  <c:v>ResNet18_ImageNet_CNTK</c:v>
+                </c:pt>
+              </c:strCache>
+            </c:strRef>
+          </c:tx>
+          <c:spPr>
+            <a:solidFill>
+              <a:schemeClr val="accent1"/>
+            </a:solidFill>
+            <a:ln>
+              <a:noFill/>
+            </a:ln>
+            <a:effectLst/>
+          </c:spPr>
+          <c:invertIfNegative val="0"/>
+          <c:cat>
+            <c:numRef>
+              <c:f>Sheet1!$D$2:$J$2</c:f>
+              <c:numCache>
+                <c:formatCode>General</c:formatCode>
+                <c:ptCount val="7"/>
+                <c:pt idx="0">
+                  <c:v>10</c:v>
+                </c:pt>
+                <c:pt idx="1">
+                  <c:v>20</c:v>
+                </c:pt>
+                <c:pt idx="2">
+                  <c:v>100</c:v>
+                </c:pt>
+                <c:pt idx="3">
+                  <c:v>200</c:v>
+                </c:pt>
+                <c:pt idx="4">
+                  <c:v>500</c:v>
+                </c:pt>
+                <c:pt idx="5">
+                  <c:v>700</c:v>
+                </c:pt>
+                <c:pt idx="6">
+                  <c:v>1000</c:v>
+                </c:pt>
+              </c:numCache>
+            </c:numRef>
+          </c:cat>
+          <c:val>
+            <c:numRef>
+              <c:f>Sheet1!$D$3:$J$3</c:f>
+              <c:numCache>
+                <c:formatCode>0.00%</c:formatCode>
+                <c:ptCount val="7"/>
+                <c:pt idx="0">
+                  <c:v>0.19570000000000001</c:v>
+                </c:pt>
+                <c:pt idx="1">
+                  <c:v>0.17142857142857101</c:v>
+                </c:pt>
+                <c:pt idx="2">
+                  <c:v>0.78139999999999998</c:v>
+                </c:pt>
+                <c:pt idx="4">
+                  <c:v>0.91714285714285704</c:v>
+                </c:pt>
+                <c:pt idx="6">
+                  <c:v>0.92</c:v>
+                </c:pt>
+              </c:numCache>
+            </c:numRef>
+          </c:val>
+          <c:extLst>
+            <c:ext xmlns:c16="http://schemas.microsoft.com/office/drawing/2014/chart" uri="{C3380CC4-5D6E-409C-BE32-E72D297353CC}">
+              <c16:uniqueId val="{00000000-6907-4536-8AFE-1E83E2A72FCA}"/>
+            </c:ext>
+          </c:extLst>
+        </c:ser>
+        <c:ser>
+          <c:idx val="1"/>
+          <c:order val="1"/>
+          <c:tx>
+            <c:strRef>
+              <c:f>Sheet1!$C$4</c:f>
+              <c:strCache>
+                <c:ptCount val="1"/>
+                <c:pt idx="0">
+                  <c:v>ResNet152_ImageNet_CNTK</c:v>
+                </c:pt>
+              </c:strCache>
+            </c:strRef>
+          </c:tx>
+          <c:spPr>
+            <a:solidFill>
+              <a:schemeClr val="accent2"/>
+            </a:solidFill>
+            <a:ln>
+              <a:noFill/>
+            </a:ln>
+            <a:effectLst/>
+          </c:spPr>
+          <c:invertIfNegative val="0"/>
+          <c:cat>
+            <c:numRef>
+              <c:f>Sheet1!$D$2:$J$2</c:f>
+              <c:numCache>
+                <c:formatCode>General</c:formatCode>
+                <c:ptCount val="7"/>
+                <c:pt idx="0">
+                  <c:v>10</c:v>
+                </c:pt>
+                <c:pt idx="1">
+                  <c:v>20</c:v>
+                </c:pt>
+                <c:pt idx="2">
+                  <c:v>100</c:v>
+                </c:pt>
+                <c:pt idx="3">
+                  <c:v>200</c:v>
+                </c:pt>
+                <c:pt idx="4">
+                  <c:v>500</c:v>
+                </c:pt>
+                <c:pt idx="5">
+                  <c:v>700</c:v>
+                </c:pt>
+                <c:pt idx="6">
+                  <c:v>1000</c:v>
+                </c:pt>
+              </c:numCache>
+            </c:numRef>
+          </c:cat>
+          <c:val>
+            <c:numRef>
+              <c:f>Sheet1!$D$4:$J$4</c:f>
+              <c:numCache>
+                <c:formatCode>0.00%</c:formatCode>
+                <c:ptCount val="7"/>
+                <c:pt idx="0">
+                  <c:v>0.14000000000000001</c:v>
+                </c:pt>
+                <c:pt idx="1">
+                  <c:v>0.22</c:v>
+                </c:pt>
+                <c:pt idx="3">
+                  <c:v>0.36428571428571399</c:v>
+                </c:pt>
+                <c:pt idx="5">
+                  <c:v>0.81142857142857105</c:v>
+                </c:pt>
+                <c:pt idx="6">
+                  <c:v>0.88857142857142801</c:v>
+                </c:pt>
+              </c:numCache>
+            </c:numRef>
+          </c:val>
+          <c:extLst>
+            <c:ext xmlns:c16="http://schemas.microsoft.com/office/drawing/2014/chart" uri="{C3380CC4-5D6E-409C-BE32-E72D297353CC}">
+              <c16:uniqueId val="{00000001-6907-4536-8AFE-1E83E2A72FCA}"/>
+            </c:ext>
+          </c:extLst>
+        </c:ser>
+        <c:dLbls>
+          <c:showLegendKey val="0"/>
+          <c:showVal val="0"/>
+          <c:showCatName val="0"/>
+          <c:showSerName val="0"/>
+          <c:showPercent val="0"/>
+          <c:showBubbleSize val="0"/>
+        </c:dLbls>
+        <c:gapWidth val="267"/>
+        <c:overlap val="-43"/>
+        <c:axId val="735607120"/>
+        <c:axId val="735604496"/>
+      </c:barChart>
+      <c:catAx>
+        <c:axId val="735607120"/>
+        <c:scaling>
+          <c:orientation val="minMax"/>
+        </c:scaling>
+        <c:delete val="0"/>
+        <c:axPos val="b"/>
+        <c:majorGridlines>
+          <c:spPr>
+            <a:ln w="9525" cap="flat" cmpd="sng" algn="ctr">
+              <a:solidFill>
+                <a:schemeClr val="dk1">
+                  <a:lumMod val="15000"/>
+                  <a:lumOff val="85000"/>
+                </a:schemeClr>
+              </a:solidFill>
+              <a:round/>
+            </a:ln>
+            <a:effectLst/>
+          </c:spPr>
+        </c:majorGridlines>
+        <c:numFmt formatCode="General" sourceLinked="1"/>
+        <c:majorTickMark val="none"/>
+        <c:minorTickMark val="none"/>
+        <c:tickLblPos val="nextTo"/>
+        <c:spPr>
+          <a:noFill/>
+          <a:ln w="9525" cap="flat" cmpd="sng" algn="ctr">
+            <a:solidFill>
+              <a:schemeClr val="dk1">
+                <a:lumMod val="15000"/>
+                <a:lumOff val="85000"/>
+              </a:schemeClr>
+            </a:solidFill>
+            <a:round/>
+          </a:ln>
+          <a:effectLst/>
+        </c:spPr>
+        <c:txPr>
+          <a:bodyPr rot="-60000000" spcFirstLastPara="1" vertOverflow="ellipsis" vert="horz" wrap="square" anchor="ctr" anchorCtr="1"/>
+          <a:lstStyle/>
+          <a:p>
+            <a:pPr>
+              <a:defRPr sz="900" b="0" i="0" u="none" strike="noStrike" kern="1200" cap="none" spc="0" normalizeH="0" baseline="0">
+                <a:solidFill>
+                  <a:schemeClr val="dk1">
+                    <a:lumMod val="65000"/>
+                    <a:lumOff val="35000"/>
+                  </a:schemeClr>
+                </a:solidFill>
+                <a:latin typeface="+mn-lt"/>
+                <a:ea typeface="+mn-ea"/>
+                <a:cs typeface="+mn-cs"/>
+              </a:defRPr>
+            </a:pPr>
+            <a:endParaRPr lang="en-US"/>
+          </a:p>
+        </c:txPr>
+        <c:crossAx val="735604496"/>
+        <c:crosses val="autoZero"/>
+        <c:auto val="1"/>
+        <c:lblAlgn val="ctr"/>
+        <c:lblOffset val="100"/>
+        <c:noMultiLvlLbl val="0"/>
+      </c:catAx>
+      <c:valAx>
+        <c:axId val="735604496"/>
+        <c:scaling>
+          <c:orientation val="minMax"/>
+        </c:scaling>
+        <c:delete val="0"/>
+        <c:axPos val="l"/>
+        <c:majorGridlines>
+          <c:spPr>
+            <a:ln w="9525" cap="flat" cmpd="sng" algn="ctr">
+              <a:solidFill>
+                <a:schemeClr val="dk1">
+                  <a:lumMod val="15000"/>
+                  <a:lumOff val="85000"/>
+                </a:schemeClr>
+              </a:solidFill>
+              <a:round/>
+            </a:ln>
+            <a:effectLst/>
+          </c:spPr>
+        </c:majorGridlines>
+        <c:numFmt formatCode="0.00%" sourceLinked="1"/>
+        <c:majorTickMark val="none"/>
+        <c:minorTickMark val="none"/>
+        <c:tickLblPos val="nextTo"/>
+        <c:spPr>
+          <a:noFill/>
+          <a:ln>
+            <a:noFill/>
+          </a:ln>
+          <a:effectLst/>
+        </c:spPr>
+        <c:txPr>
+          <a:bodyPr rot="-60000000" spcFirstLastPara="1" vertOverflow="ellipsis" vert="horz" wrap="square" anchor="ctr" anchorCtr="1"/>
+          <a:lstStyle/>
+          <a:p>
+            <a:pPr>
+              <a:defRPr sz="900" b="0" i="0" u="none" strike="noStrike" kern="1200" baseline="0">
+                <a:solidFill>
+                  <a:schemeClr val="dk1">
+                    <a:lumMod val="65000"/>
+                    <a:lumOff val="35000"/>
+                  </a:schemeClr>
+                </a:solidFill>
+                <a:latin typeface="+mn-lt"/>
+                <a:ea typeface="+mn-ea"/>
+                <a:cs typeface="+mn-cs"/>
+              </a:defRPr>
+            </a:pPr>
+            <a:endParaRPr lang="en-US"/>
+          </a:p>
+        </c:txPr>
+        <c:crossAx val="735607120"/>
+        <c:crosses val="autoZero"/>
+        <c:crossBetween val="between"/>
+      </c:valAx>
+      <c:dTable>
+        <c:showHorzBorder val="1"/>
+        <c:showVertBorder val="1"/>
+        <c:showOutline val="1"/>
+        <c:showKeys val="1"/>
+        <c:spPr>
+          <a:noFill/>
+          <a:ln w="9525" cap="flat" cmpd="sng" algn="ctr">
+            <a:solidFill>
+              <a:schemeClr val="dk1">
+                <a:lumMod val="15000"/>
+                <a:lumOff val="85000"/>
+              </a:schemeClr>
+            </a:solidFill>
+            <a:round/>
+          </a:ln>
+          <a:effectLst/>
+        </c:spPr>
+        <c:txPr>
+          <a:bodyPr rot="0" spcFirstLastPara="1" vertOverflow="ellipsis" vert="horz" wrap="square" anchor="ctr" anchorCtr="1"/>
+          <a:lstStyle/>
+          <a:p>
+            <a:pPr rtl="0">
+              <a:defRPr sz="800" b="0" i="0" u="none" strike="noStrike" kern="1200" baseline="0">
+                <a:solidFill>
+                  <a:schemeClr val="dk1">
+                    <a:lumMod val="65000"/>
+                    <a:lumOff val="35000"/>
+                  </a:schemeClr>
+                </a:solidFill>
+                <a:latin typeface="+mn-lt"/>
+                <a:ea typeface="+mn-ea"/>
+                <a:cs typeface="+mn-cs"/>
+              </a:defRPr>
+            </a:pPr>
+            <a:endParaRPr lang="en-US"/>
+          </a:p>
+        </c:txPr>
+      </c:dTable>
+      <c:spPr>
+        <a:pattFill prst="ltDnDiag">
+          <a:fgClr>
+            <a:schemeClr val="dk1">
+              <a:lumMod val="15000"/>
+              <a:lumOff val="85000"/>
+            </a:schemeClr>
+          </a:fgClr>
+          <a:bgClr>
+            <a:schemeClr val="lt1"/>
+          </a:bgClr>
+        </a:pattFill>
+        <a:ln>
+          <a:noFill/>
+        </a:ln>
+        <a:effectLst/>
+      </c:spPr>
+    </c:plotArea>
+    <c:plotVisOnly val="1"/>
+    <c:dispBlanksAs val="gap"/>
+    <c:showDLblsOverMax val="0"/>
+  </c:chart>
+  <c:spPr>
+    <a:solidFill>
+      <a:schemeClr val="lt1"/>
+    </a:solidFill>
+    <a:ln w="9525" cap="flat" cmpd="sng" algn="ctr">
+      <a:solidFill>
+        <a:schemeClr val="dk1">
+          <a:lumMod val="15000"/>
+          <a:lumOff val="85000"/>
+        </a:schemeClr>
+      </a:solidFill>
+      <a:round/>
+    </a:ln>
+    <a:effectLst/>
+  </c:spPr>
+  <c:txPr>
+    <a:bodyPr/>
+    <a:lstStyle/>
+    <a:p>
+      <a:pPr>
+        <a:defRPr/>
+      </a:pPr>
+      <a:endParaRPr lang="en-US"/>
+    </a:p>
+  </c:txPr>
+  <c:externalData r:id="rId3">
+    <c:autoUpdate val="0"/>
+  </c:externalData>
+</c:chartSpace>
+</file>
+
+<file path=ppt/charts/colors1.xml><?xml version="1.0" encoding="utf-8"?>
+<cs:colorStyle xmlns:cs="http://schemas.microsoft.com/office/drawing/2012/chartStyle" xmlns:a="http://schemas.openxmlformats.org/drawingml/2006/main" meth="cycle" id="10">
+  <a:schemeClr val="accent1"/>
+  <a:schemeClr val="accent2"/>
+  <a:schemeClr val="accent3"/>
+  <a:schemeClr val="accent4"/>
+  <a:schemeClr val="accent5"/>
+  <a:schemeClr val="accent6"/>
+  <cs:variation/>
+  <cs:variation>
+    <a:lumMod val="60000"/>
+  </cs:variation>
+  <cs:variation>
+    <a:lumMod val="80000"/>
+    <a:lumOff val="20000"/>
+  </cs:variation>
+  <cs:variation>
+    <a:lumMod val="80000"/>
+  </cs:variation>
+  <cs:variation>
+    <a:lumMod val="60000"/>
+    <a:lumOff val="40000"/>
+  </cs:variation>
+  <cs:variation>
+    <a:lumMod val="50000"/>
+  </cs:variation>
+  <cs:variation>
+    <a:lumMod val="70000"/>
+    <a:lumOff val="30000"/>
+  </cs:variation>
+  <cs:variation>
+    <a:lumMod val="70000"/>
+  </cs:variation>
+  <cs:variation>
+    <a:lumMod val="50000"/>
+    <a:lumOff val="50000"/>
+  </cs:variation>
+</cs:colorStyle>
+</file>
+
+<file path=ppt/charts/style1.xml><?xml version="1.0" encoding="utf-8"?>
+<cs:chartStyle xmlns:cs="http://schemas.microsoft.com/office/drawing/2012/chartStyle" xmlns:a="http://schemas.openxmlformats.org/drawingml/2006/main" id="208">
+  <cs:axisTitle>
+    <cs:lnRef idx="0"/>
+    <cs:fillRef idx="0"/>
+    <cs:effectRef idx="0"/>
+    <cs:fontRef idx="minor">
+      <a:schemeClr val="dk1">
+        <a:lumMod val="65000"/>
+        <a:lumOff val="35000"/>
+      </a:schemeClr>
+    </cs:fontRef>
+    <cs:defRPr sz="900" b="1" kern="1200"/>
+  </cs:axisTitle>
+  <cs:categoryAxis>
+    <cs:lnRef idx="0"/>
+    <cs:fillRef idx="0"/>
+    <cs:effectRef idx="0"/>
+    <cs:fontRef idx="minor">
+      <a:schemeClr val="dk1">
+        <a:lumMod val="65000"/>
+        <a:lumOff val="35000"/>
+      </a:schemeClr>
+    </cs:fontRef>
+    <cs:spPr>
+      <a:ln w="9525" cap="flat" cmpd="sng" algn="ctr">
+        <a:solidFill>
+          <a:schemeClr val="dk1">
+            <a:lumMod val="15000"/>
+            <a:lumOff val="85000"/>
+          </a:schemeClr>
+        </a:solidFill>
+        <a:round/>
+      </a:ln>
+    </cs:spPr>
+    <cs:defRPr sz="900" kern="1200" cap="none" spc="0" normalizeH="0" baseline="0"/>
+  </cs:categoryAxis>
+  <cs:chartArea>
+    <cs:lnRef idx="0"/>
+    <cs:fillRef idx="0"/>
+    <cs:effectRef idx="0"/>
+    <cs:fontRef idx="minor">
+      <a:schemeClr val="dk1"/>
+    </cs:fontRef>
+    <cs:spPr>
+      <a:solidFill>
+        <a:schemeClr val="lt1"/>
+      </a:solidFill>
+      <a:ln w="9525" cap="flat" cmpd="sng" algn="ctr">
+        <a:solidFill>
+          <a:schemeClr val="dk1">
+            <a:lumMod val="15000"/>
+            <a:lumOff val="85000"/>
+          </a:schemeClr>
+        </a:solidFill>
+        <a:round/>
+      </a:ln>
+    </cs:spPr>
+    <cs:defRPr sz="900" kern="1200"/>
+  </cs:chartArea>
+  <cs:dataLabel>
+    <cs:lnRef idx="0"/>
+    <cs:fillRef idx="0"/>
+    <cs:effectRef idx="0"/>
+    <cs:fontRef idx="minor">
+      <a:schemeClr val="dk1">
+        <a:lumMod val="75000"/>
+        <a:lumOff val="25000"/>
+      </a:schemeClr>
+    </cs:fontRef>
+    <cs:defRPr sz="900" kern="1200"/>
+  </cs:dataLabel>
+  <cs:dataLabelCallout>
+    <cs:lnRef idx="0"/>
+    <cs:fillRef idx="0"/>
+    <cs:effectRef idx="0"/>
+    <cs:fontRef idx="minor">
+      <a:schemeClr val="dk1">
+        <a:lumMod val="65000"/>
+        <a:lumOff val="35000"/>
+      </a:schemeClr>
+    </cs:fontRef>
+    <cs:spPr>
+      <a:solidFill>
+        <a:schemeClr val="lt1"/>
+      </a:solidFill>
+      <a:ln>
+        <a:solidFill>
+          <a:schemeClr val="dk1">
+            <a:lumMod val="25000"/>
+            <a:lumOff val="75000"/>
+          </a:schemeClr>
+        </a:solidFill>
+      </a:ln>
+    </cs:spPr>
+    <cs:defRPr sz="900" kern="1200"/>
+    <cs:bodyPr rot="0" spcFirstLastPara="1" vertOverflow="clip" horzOverflow="clip" vert="horz" wrap="square" lIns="36576" tIns="18288" rIns="36576" bIns="18288" anchor="ctr" anchorCtr="1">
+      <a:spAutoFit/>
+    </cs:bodyPr>
+  </cs:dataLabelCallout>
+  <cs:dataPoint>
+    <cs:lnRef idx="0"/>
+    <cs:fillRef idx="0">
+      <cs:styleClr val="auto"/>
+    </cs:fillRef>
+    <cs:effectRef idx="0"/>
+    <cs:fontRef idx="minor">
+      <a:schemeClr val="dk1"/>
+    </cs:fontRef>
+    <cs:spPr>
+      <a:solidFill>
+        <a:schemeClr val="phClr"/>
+      </a:solidFill>
+    </cs:spPr>
+  </cs:dataPoint>
+  <cs:dataPoint3D>
+    <cs:lnRef idx="0"/>
+    <cs:fillRef idx="0">
+      <cs:styleClr val="auto"/>
+    </cs:fillRef>
+    <cs:effectRef idx="0"/>
+    <cs:fontRef idx="minor">
+      <a:schemeClr val="dk1"/>
+    </cs:fontRef>
+    <cs:spPr>
+      <a:solidFill>
+        <a:schemeClr val="phClr"/>
+      </a:solidFill>
+    </cs:spPr>
+  </cs:dataPoint3D>
+  <cs:dataPointLine>
+    <cs:lnRef idx="0">
+      <cs:styleClr val="auto"/>
+    </cs:lnRef>
+    <cs:fillRef idx="0"/>
+    <cs:effectRef idx="0"/>
+    <cs:fontRef idx="minor">
+      <a:schemeClr val="dk1"/>
+    </cs:fontRef>
+    <cs:spPr>
+      <a:ln w="22225" cap="rnd">
+        <a:solidFill>
+          <a:schemeClr val="phClr"/>
+        </a:solidFill>
+        <a:round/>
+      </a:ln>
+    </cs:spPr>
+  </cs:dataPointLine>
+  <cs:dataPointMarker>
+    <cs:lnRef idx="0">
+      <cs:styleClr val="auto"/>
+    </cs:lnRef>
+    <cs:fillRef idx="0">
+      <cs:styleClr val="auto"/>
+    </cs:fillRef>
+    <cs:effectRef idx="0"/>
+    <cs:fontRef idx="minor">
+      <a:schemeClr val="dk1"/>
+    </cs:fontRef>
+    <cs:spPr>
+      <a:solidFill>
+        <a:schemeClr val="lt1"/>
+      </a:solidFill>
+      <a:ln w="15875">
+        <a:solidFill>
+          <a:schemeClr val="phClr"/>
+        </a:solidFill>
+        <a:round/>
+      </a:ln>
+    </cs:spPr>
+  </cs:dataPointMarker>
+  <cs:dataPointMarkerLayout symbol="circle" size="6"/>
+  <cs:dataPointWireframe>
+    <cs:lnRef idx="0">
+      <cs:styleClr val="auto"/>
+    </cs:lnRef>
+    <cs:fillRef idx="0"/>
+    <cs:effectRef idx="0"/>
+    <cs:fontRef idx="minor">
+      <a:schemeClr val="dk1"/>
+    </cs:fontRef>
+    <cs:spPr>
+      <a:ln w="9525" cap="rnd">
+        <a:solidFill>
+          <a:schemeClr val="phClr"/>
+        </a:solidFill>
+        <a:round/>
+      </a:ln>
+    </cs:spPr>
+  </cs:dataPointWireframe>
+  <cs:dataTable>
+    <cs:lnRef idx="0"/>
+    <cs:fillRef idx="0"/>
+    <cs:effectRef idx="0"/>
+    <cs:fontRef idx="minor">
+      <a:schemeClr val="dk1">
+        <a:lumMod val="65000"/>
+        <a:lumOff val="35000"/>
+      </a:schemeClr>
+    </cs:fontRef>
+    <cs:spPr>
+      <a:ln w="9525" cap="flat" cmpd="sng" algn="ctr">
+        <a:solidFill>
+          <a:schemeClr val="dk1">
+            <a:lumMod val="15000"/>
+            <a:lumOff val="85000"/>
+          </a:schemeClr>
+        </a:solidFill>
+        <a:round/>
+      </a:ln>
+    </cs:spPr>
+    <cs:defRPr sz="800" kern="1200"/>
+  </cs:dataTable>
+  <cs:downBar>
+    <cs:lnRef idx="0"/>
+    <cs:fillRef idx="0"/>
+    <cs:effectRef idx="0"/>
+    <cs:fontRef idx="minor">
+      <a:schemeClr val="dk1"/>
+    </cs:fontRef>
+    <cs:spPr>
+      <a:solidFill>
+        <a:schemeClr val="dk1">
+          <a:lumMod val="75000"/>
+          <a:lumOff val="25000"/>
+        </a:schemeClr>
+      </a:solidFill>
+      <a:ln w="9525" cap="flat" cmpd="sng" algn="ctr">
+        <a:solidFill>
+          <a:schemeClr val="dk1">
+            <a:lumMod val="50000"/>
+            <a:lumOff val="50000"/>
+          </a:schemeClr>
+        </a:solidFill>
+        <a:round/>
+      </a:ln>
+    </cs:spPr>
+  </cs:downBar>
+  <cs:dropLine>
+    <cs:lnRef idx="0"/>
+    <cs:fillRef idx="0"/>
+    <cs:effectRef idx="0"/>
+    <cs:fontRef idx="minor">
+      <a:schemeClr val="dk1"/>
+    </cs:fontRef>
+    <cs:spPr>
+      <a:ln w="9525" cap="flat" cmpd="sng" algn="ctr">
+        <a:solidFill>
+          <a:schemeClr val="dk1">
+            <a:lumMod val="35000"/>
+            <a:lumOff val="65000"/>
+          </a:schemeClr>
+        </a:solidFill>
+        <a:round/>
+      </a:ln>
+    </cs:spPr>
+  </cs:dropLine>
+  <cs:errorBar>
+    <cs:lnRef idx="0"/>
+    <cs:fillRef idx="0"/>
+    <cs:effectRef idx="0"/>
+    <cs:fontRef idx="minor">
+      <a:schemeClr val="dk1"/>
+    </cs:fontRef>
+    <cs:spPr>
+      <a:ln w="9525" cap="flat" cmpd="sng" algn="ctr">
+        <a:solidFill>
+          <a:schemeClr val="dk1">
+            <a:lumMod val="50000"/>
+            <a:lumOff val="50000"/>
+          </a:schemeClr>
+        </a:solidFill>
+        <a:round/>
+      </a:ln>
+    </cs:spPr>
+  </cs:errorBar>
+  <cs:floor>
+    <cs:lnRef idx="0"/>
+    <cs:fillRef idx="0"/>
+    <cs:effectRef idx="0"/>
+    <cs:fontRef idx="minor">
+      <a:schemeClr val="dk1"/>
+    </cs:fontRef>
+    <cs:spPr>
+      <a:pattFill prst="ltDnDiag">
+        <a:fgClr>
+          <a:schemeClr val="dk1">
+            <a:lumMod val="15000"/>
+            <a:lumOff val="85000"/>
+          </a:schemeClr>
+        </a:fgClr>
+        <a:bgClr>
+          <a:schemeClr val="lt1"/>
+        </a:bgClr>
+      </a:pattFill>
+    </cs:spPr>
+  </cs:floor>
+  <cs:gridlineMajor>
+    <cs:lnRef idx="0"/>
+    <cs:fillRef idx="0"/>
+    <cs:effectRef idx="0"/>
+    <cs:fontRef idx="minor">
+      <a:schemeClr val="dk1"/>
+    </cs:fontRef>
+    <cs:spPr>
+      <a:ln w="9525" cap="flat" cmpd="sng" algn="ctr">
+        <a:solidFill>
+          <a:schemeClr val="dk1">
+            <a:lumMod val="15000"/>
+            <a:lumOff val="85000"/>
+          </a:schemeClr>
+        </a:solidFill>
+        <a:round/>
+      </a:ln>
+    </cs:spPr>
+  </cs:gridlineMajor>
+  <cs:gridlineMinor>
+    <cs:lnRef idx="0"/>
+    <cs:fillRef idx="0"/>
+    <cs:effectRef idx="0"/>
+    <cs:fontRef idx="minor">
+      <a:schemeClr val="dk1"/>
+    </cs:fontRef>
+    <cs:spPr>
+      <a:ln w="9525" cap="flat" cmpd="sng" algn="ctr">
+        <a:solidFill>
+          <a:schemeClr val="dk1">
+            <a:lumMod val="5000"/>
+            <a:lumOff val="95000"/>
+          </a:schemeClr>
+        </a:solidFill>
+        <a:round/>
+      </a:ln>
+    </cs:spPr>
+  </cs:gridlineMinor>
+  <cs:hiLoLine>
+    <cs:lnRef idx="0"/>
+    <cs:fillRef idx="0"/>
+    <cs:effectRef idx="0"/>
+    <cs:fontRef idx="minor">
+      <a:schemeClr val="dk1"/>
+    </cs:fontRef>
+    <cs:spPr>
+      <a:ln w="9525" cap="flat" cmpd="sng" algn="ctr">
+        <a:solidFill>
+          <a:schemeClr val="dk1">
+            <a:lumMod val="35000"/>
+            <a:lumOff val="65000"/>
+          </a:schemeClr>
+        </a:solidFill>
+        <a:round/>
+      </a:ln>
+    </cs:spPr>
+  </cs:hiLoLine>
+  <cs:leaderLine>
+    <cs:lnRef idx="0"/>
+    <cs:fillRef idx="0"/>
+    <cs:effectRef idx="0"/>
+    <cs:fontRef idx="minor">
+      <a:schemeClr val="dk1"/>
+    </cs:fontRef>
+    <cs:spPr>
+      <a:ln w="9525" cap="flat" cmpd="sng" algn="ctr">
+        <a:solidFill>
+          <a:schemeClr val="dk1">
+            <a:lumMod val="35000"/>
+            <a:lumOff val="65000"/>
+          </a:schemeClr>
+        </a:solidFill>
+        <a:round/>
+      </a:ln>
+    </cs:spPr>
+  </cs:leaderLine>
+  <cs:legend>
+    <cs:lnRef idx="0"/>
+    <cs:fillRef idx="0"/>
+    <cs:effectRef idx="0"/>
+    <cs:fontRef idx="minor">
+      <a:schemeClr val="dk1">
+        <a:lumMod val="65000"/>
+        <a:lumOff val="35000"/>
+      </a:schemeClr>
+    </cs:fontRef>
+    <cs:defRPr sz="900" kern="1200"/>
+  </cs:legend>
+  <cs:plotArea>
+    <cs:lnRef idx="0"/>
+    <cs:fillRef idx="0"/>
+    <cs:effectRef idx="0"/>
+    <cs:fontRef idx="minor">
+      <a:schemeClr val="dk1"/>
+    </cs:fontRef>
+    <cs:spPr>
+      <a:pattFill prst="ltDnDiag">
+        <a:fgClr>
+          <a:schemeClr val="dk1">
+            <a:lumMod val="15000"/>
+            <a:lumOff val="85000"/>
+          </a:schemeClr>
+        </a:fgClr>
+        <a:bgClr>
+          <a:schemeClr val="lt1"/>
+        </a:bgClr>
+      </a:pattFill>
+    </cs:spPr>
+  </cs:plotArea>
+  <cs:plotArea3D>
+    <cs:lnRef idx="0"/>
+    <cs:fillRef idx="0"/>
+    <cs:effectRef idx="0"/>
+    <cs:fontRef idx="minor">
+      <a:schemeClr val="dk1"/>
+    </cs:fontRef>
+    <cs:spPr>
+      <a:solidFill>
+        <a:schemeClr val="lt1"/>
+      </a:solidFill>
+    </cs:spPr>
+  </cs:plotArea3D>
+  <cs:seriesAxis>
+    <cs:lnRef idx="0"/>
+    <cs:fillRef idx="0"/>
+    <cs:effectRef idx="0"/>
+    <cs:fontRef idx="minor">
+      <a:schemeClr val="dk1">
+        <a:lumMod val="65000"/>
+        <a:lumOff val="35000"/>
+      </a:schemeClr>
+    </cs:fontRef>
+    <cs:defRPr sz="900" kern="1200"/>
+  </cs:seriesAxis>
+  <cs:seriesLine>
+    <cs:lnRef idx="0"/>
+    <cs:fillRef idx="0"/>
+    <cs:effectRef idx="0"/>
+    <cs:fontRef idx="minor">
+      <a:schemeClr val="dk1"/>
+    </cs:fontRef>
+    <cs:spPr>
+      <a:ln w="9525" cap="flat" cmpd="sng" algn="ctr">
+        <a:solidFill>
+          <a:schemeClr val="dk1">
+            <a:lumMod val="35000"/>
+            <a:lumOff val="65000"/>
+          </a:schemeClr>
+        </a:solidFill>
+        <a:round/>
+      </a:ln>
+    </cs:spPr>
+  </cs:seriesLine>
+  <cs:title>
+    <cs:lnRef idx="0"/>
+    <cs:fillRef idx="0"/>
+    <cs:effectRef idx="0"/>
+    <cs:fontRef idx="major">
+      <a:schemeClr val="dk1">
+        <a:lumMod val="50000"/>
+        <a:lumOff val="50000"/>
+      </a:schemeClr>
+    </cs:fontRef>
+    <cs:defRPr sz="1600" b="1" kern="1200" cap="none" spc="0" normalizeH="0" baseline="0"/>
+  </cs:title>
+  <cs:trendline>
+    <cs:lnRef idx="0">
+      <cs:styleClr val="auto"/>
+    </cs:lnRef>
+    <cs:fillRef idx="0"/>
+    <cs:effectRef idx="0"/>
+    <cs:fontRef idx="minor">
+      <a:schemeClr val="dk1"/>
+    </cs:fontRef>
+    <cs:spPr>
+      <a:ln w="19050" cap="rnd">
+        <a:solidFill>
+          <a:schemeClr val="phClr"/>
+        </a:solidFill>
+      </a:ln>
+    </cs:spPr>
+  </cs:trendline>
+  <cs:trendlineLabel>
+    <cs:lnRef idx="0"/>
+    <cs:fillRef idx="0"/>
+    <cs:effectRef idx="0"/>
+    <cs:fontRef idx="minor">
+      <a:schemeClr val="dk1">
+        <a:lumMod val="65000"/>
+        <a:lumOff val="35000"/>
+      </a:schemeClr>
+    </cs:fontRef>
+    <cs:defRPr sz="900" kern="1200"/>
+  </cs:trendlineLabel>
+  <cs:upBar>
+    <cs:lnRef idx="0"/>
+    <cs:fillRef idx="0"/>
+    <cs:effectRef idx="0"/>
+    <cs:fontRef idx="minor">
+      <a:schemeClr val="dk1"/>
+    </cs:fontRef>
+    <cs:spPr>
+      <a:solidFill>
+        <a:schemeClr val="lt1"/>
+      </a:solidFill>
+      <a:ln w="9525" cap="flat" cmpd="sng" algn="ctr">
+        <a:solidFill>
+          <a:schemeClr val="dk1">
+            <a:lumMod val="50000"/>
+            <a:lumOff val="50000"/>
+          </a:schemeClr>
+        </a:solidFill>
+        <a:round/>
+      </a:ln>
+    </cs:spPr>
+  </cs:upBar>
+  <cs:valueAxis>
+    <cs:lnRef idx="0"/>
+    <cs:fillRef idx="0"/>
+    <cs:effectRef idx="0"/>
+    <cs:fontRef idx="minor">
+      <a:schemeClr val="dk1">
+        <a:lumMod val="65000"/>
+        <a:lumOff val="35000"/>
+      </a:schemeClr>
+    </cs:fontRef>
+    <cs:defRPr sz="900" kern="1200"/>
+  </cs:valueAxis>
+  <cs:wall>
+    <cs:lnRef idx="0"/>
+    <cs:fillRef idx="0"/>
+    <cs:effectRef idx="0"/>
+    <cs:fontRef idx="minor">
+      <a:schemeClr val="dk1"/>
+    </cs:fontRef>
+    <cs:spPr>
+      <a:pattFill prst="ltDnDiag">
+        <a:fgClr>
+          <a:schemeClr val="dk1">
+            <a:lumMod val="15000"/>
+            <a:lumOff val="85000"/>
+          </a:schemeClr>
+        </a:fgClr>
+        <a:bgClr>
+          <a:schemeClr val="lt1"/>
+        </a:bgClr>
+      </a:pattFill>
+    </cs:spPr>
+  </cs:wall>
+</cs:chartStyle>
+</file>
+
 <file path=ppt/notesMasters/notesMaster1.xml><?xml version="1.0" encoding="utf-8"?>
 <p:notesMaster xmlns:a="http://schemas.openxmlformats.org/drawingml/2006/main" xmlns:r="http://schemas.openxmlformats.org/officeDocument/2006/relationships" xmlns:p="http://schemas.openxmlformats.org/presentationml/2006/main">
   <p:cSld>
@@ -204,7 +1266,7 @@
           <a:p>
             <a:fld id="{0B2598F9-4ADA-4B51-B6CC-F76EAD98554E}" type="datetimeFigureOut">
               <a:rPr lang="en-US" smtClean="0"/>
-              <a:t>11/22/2017</a:t>
+              <a:t>12/1/2017</a:t>
             </a:fld>
             <a:endParaRPr lang="en-US"/>
           </a:p>
@@ -556,6 +1618,90 @@
 </p:notes>
 </file>
 
+<file path=ppt/notesSlides/notesSlide10.xml><?xml version="1.0" encoding="utf-8"?>
+<p:notes xmlns:a="http://schemas.openxmlformats.org/drawingml/2006/main" xmlns:r="http://schemas.openxmlformats.org/officeDocument/2006/relationships" xmlns:p="http://schemas.openxmlformats.org/presentationml/2006/main">
+  <p:cSld>
+    <p:spTree>
+      <p:nvGrpSpPr>
+        <p:cNvPr id="1" name=""/>
+        <p:cNvGrpSpPr/>
+        <p:nvPr/>
+      </p:nvGrpSpPr>
+      <p:grpSpPr>
+        <a:xfrm>
+          <a:off x="0" y="0"/>
+          <a:ext cx="0" cy="0"/>
+          <a:chOff x="0" y="0"/>
+          <a:chExt cx="0" cy="0"/>
+        </a:xfrm>
+      </p:grpSpPr>
+      <p:sp>
+        <p:nvSpPr>
+          <p:cNvPr id="2" name="Slide Image Placeholder 1"/>
+          <p:cNvSpPr>
+            <a:spLocks noGrp="1" noRot="1" noChangeAspect="1"/>
+          </p:cNvSpPr>
+          <p:nvPr>
+            <p:ph type="sldImg"/>
+          </p:nvPr>
+        </p:nvSpPr>
+        <p:spPr/>
+      </p:sp>
+      <p:sp>
+        <p:nvSpPr>
+          <p:cNvPr id="3" name="Notes Placeholder 2"/>
+          <p:cNvSpPr>
+            <a:spLocks noGrp="1"/>
+          </p:cNvSpPr>
+          <p:nvPr>
+            <p:ph type="body" idx="1"/>
+          </p:nvPr>
+        </p:nvSpPr>
+        <p:spPr/>
+        <p:txBody>
+          <a:bodyPr/>
+          <a:lstStyle/>
+          <a:p>
+            <a:endParaRPr lang="en-US"/>
+          </a:p>
+        </p:txBody>
+      </p:sp>
+      <p:sp>
+        <p:nvSpPr>
+          <p:cNvPr id="4" name="Slide Number Placeholder 3"/>
+          <p:cNvSpPr>
+            <a:spLocks noGrp="1"/>
+          </p:cNvSpPr>
+          <p:nvPr>
+            <p:ph type="sldNum" sz="quarter" idx="10"/>
+          </p:nvPr>
+        </p:nvSpPr>
+        <p:spPr/>
+        <p:txBody>
+          <a:bodyPr/>
+          <a:lstStyle/>
+          <a:p>
+            <a:fld id="{ABEBCB03-436C-4D8F-97DD-0E8CF3A00739}" type="slidenum">
+              <a:rPr lang="en-US" smtClean="0"/>
+              <a:t>10</a:t>
+            </a:fld>
+            <a:endParaRPr lang="en-US"/>
+          </a:p>
+        </p:txBody>
+      </p:sp>
+    </p:spTree>
+    <p:extLst>
+      <p:ext uri="{BB962C8B-B14F-4D97-AF65-F5344CB8AC3E}">
+        <p14:creationId xmlns:p14="http://schemas.microsoft.com/office/powerpoint/2010/main" val="261391407"/>
+      </p:ext>
+    </p:extLst>
+  </p:cSld>
+  <p:clrMapOvr>
+    <a:masterClrMapping/>
+  </p:clrMapOvr>
+</p:notes>
+</file>
+
 <file path=ppt/notesSlides/notesSlide2.xml><?xml version="1.0" encoding="utf-8"?>
 <p:notes xmlns:a="http://schemas.openxmlformats.org/drawingml/2006/main" xmlns:r="http://schemas.openxmlformats.org/officeDocument/2006/relationships" xmlns:p="http://schemas.openxmlformats.org/presentationml/2006/main">
   <p:cSld>
@@ -703,18 +1849,78 @@
           <a:bodyPr/>
           <a:lstStyle/>
           <a:p>
+            <a:pPr marL="0" marR="0" lvl="0" indent="0" algn="r" defTabSz="914400" rtl="0" eaLnBrk="1" fontAlgn="auto" latinLnBrk="0" hangingPunct="1">
+              <a:lnSpc>
+                <a:spcPct val="100000"/>
+              </a:lnSpc>
+              <a:spcBef>
+                <a:spcPts val="0"/>
+              </a:spcBef>
+              <a:spcAft>
+                <a:spcPts val="0"/>
+              </a:spcAft>
+              <a:buClrTx/>
+              <a:buSzTx/>
+              <a:buFontTx/>
+              <a:buNone/>
+              <a:tabLst/>
+              <a:defRPr/>
+            </a:pPr>
             <a:fld id="{ABEBCB03-436C-4D8F-97DD-0E8CF3A00739}" type="slidenum">
-              <a:rPr lang="en-US" smtClean="0"/>
+              <a:rPr kumimoji="0" lang="en-US" sz="1200" b="0" i="0" u="none" strike="noStrike" kern="1200" cap="none" spc="0" normalizeH="0" baseline="0" noProof="0" smtClean="0">
+                <a:ln>
+                  <a:noFill/>
+                </a:ln>
+                <a:solidFill>
+                  <a:prstClr val="black"/>
+                </a:solidFill>
+                <a:effectLst/>
+                <a:uLnTx/>
+                <a:uFillTx/>
+                <a:latin typeface="Calibri" panose="020F0502020204030204"/>
+                <a:ea typeface="+mn-ea"/>
+                <a:cs typeface="+mn-cs"/>
+              </a:rPr>
+              <a:pPr marL="0" marR="0" lvl="0" indent="0" algn="r" defTabSz="914400" rtl="0" eaLnBrk="1" fontAlgn="auto" latinLnBrk="0" hangingPunct="1">
+                <a:lnSpc>
+                  <a:spcPct val="100000"/>
+                </a:lnSpc>
+                <a:spcBef>
+                  <a:spcPts val="0"/>
+                </a:spcBef>
+                <a:spcAft>
+                  <a:spcPts val="0"/>
+                </a:spcAft>
+                <a:buClrTx/>
+                <a:buSzTx/>
+                <a:buFontTx/>
+                <a:buNone/>
+                <a:tabLst/>
+                <a:defRPr/>
+              </a:pPr>
               <a:t>3</a:t>
             </a:fld>
-            <a:endParaRPr lang="en-US"/>
+            <a:endParaRPr kumimoji="0" lang="en-US" sz="1200" b="0" i="0" u="none" strike="noStrike" kern="1200" cap="none" spc="0" normalizeH="0" baseline="0" noProof="0">
+              <a:ln>
+                <a:noFill/>
+              </a:ln>
+              <a:solidFill>
+                <a:prstClr val="black"/>
+              </a:solidFill>
+              <a:effectLst/>
+              <a:uLnTx/>
+              <a:uFillTx/>
+              <a:latin typeface="Calibri" panose="020F0502020204030204"/>
+              <a:ea typeface="+mn-ea"/>
+              <a:cs typeface="+mn-cs"/>
+            </a:endParaRPr>
           </a:p>
         </p:txBody>
       </p:sp>
     </p:spTree>
     <p:extLst>
       <p:ext uri="{BB962C8B-B14F-4D97-AF65-F5344CB8AC3E}">
-        <p14:creationId xmlns:p14="http://schemas.microsoft.com/office/powerpoint/2010/main" val="3284739005"/>
+        <p14:creationId xmlns:p14="http://schemas.microsoft.com/office/powerpoint/2010/main" val="771447574"/>
       </p:ext>
     </p:extLst>
   </p:cSld>
@@ -798,7 +2004,7 @@
     </p:spTree>
     <p:extLst>
       <p:ext uri="{BB962C8B-B14F-4D97-AF65-F5344CB8AC3E}">
-        <p14:creationId xmlns:p14="http://schemas.microsoft.com/office/powerpoint/2010/main" val="662822752"/>
+        <p14:creationId xmlns:p14="http://schemas.microsoft.com/office/powerpoint/2010/main" val="223020114"/>
       </p:ext>
     </p:extLst>
   </p:cSld>
@@ -882,7 +2088,7 @@
     </p:spTree>
     <p:extLst>
       <p:ext uri="{BB962C8B-B14F-4D97-AF65-F5344CB8AC3E}">
-        <p14:creationId xmlns:p14="http://schemas.microsoft.com/office/powerpoint/2010/main" val="703926922"/>
+        <p14:creationId xmlns:p14="http://schemas.microsoft.com/office/powerpoint/2010/main" val="662822752"/>
       </p:ext>
     </p:extLst>
   </p:cSld>
@@ -966,7 +2172,7 @@
     </p:spTree>
     <p:extLst>
       <p:ext uri="{BB962C8B-B14F-4D97-AF65-F5344CB8AC3E}">
-        <p14:creationId xmlns:p14="http://schemas.microsoft.com/office/powerpoint/2010/main" val="1409824505"/>
+        <p14:creationId xmlns:p14="http://schemas.microsoft.com/office/powerpoint/2010/main" val="703926922"/>
       </p:ext>
     </p:extLst>
   </p:cSld>
@@ -1050,7 +2256,7 @@
     </p:spTree>
     <p:extLst>
       <p:ext uri="{BB962C8B-B14F-4D97-AF65-F5344CB8AC3E}">
-        <p14:creationId xmlns:p14="http://schemas.microsoft.com/office/powerpoint/2010/main" val="2822291269"/>
+        <p14:creationId xmlns:p14="http://schemas.microsoft.com/office/powerpoint/2010/main" val="3656742589"/>
       </p:ext>
     </p:extLst>
   </p:cSld>
@@ -1134,7 +2340,91 @@
     </p:spTree>
     <p:extLst>
       <p:ext uri="{BB962C8B-B14F-4D97-AF65-F5344CB8AC3E}">
-        <p14:creationId xmlns:p14="http://schemas.microsoft.com/office/powerpoint/2010/main" val="529384093"/>
+        <p14:creationId xmlns:p14="http://schemas.microsoft.com/office/powerpoint/2010/main" val="1409824505"/>
+      </p:ext>
+    </p:extLst>
+  </p:cSld>
+  <p:clrMapOvr>
+    <a:masterClrMapping/>
+  </p:clrMapOvr>
+</p:notes>
+</file>
+
+<file path=ppt/notesSlides/notesSlide9.xml><?xml version="1.0" encoding="utf-8"?>
+<p:notes xmlns:a="http://schemas.openxmlformats.org/drawingml/2006/main" xmlns:r="http://schemas.openxmlformats.org/officeDocument/2006/relationships" xmlns:p="http://schemas.openxmlformats.org/presentationml/2006/main">
+  <p:cSld>
+    <p:spTree>
+      <p:nvGrpSpPr>
+        <p:cNvPr id="1" name=""/>
+        <p:cNvGrpSpPr/>
+        <p:nvPr/>
+      </p:nvGrpSpPr>
+      <p:grpSpPr>
+        <a:xfrm>
+          <a:off x="0" y="0"/>
+          <a:ext cx="0" cy="0"/>
+          <a:chOff x="0" y="0"/>
+          <a:chExt cx="0" cy="0"/>
+        </a:xfrm>
+      </p:grpSpPr>
+      <p:sp>
+        <p:nvSpPr>
+          <p:cNvPr id="2" name="Slide Image Placeholder 1"/>
+          <p:cNvSpPr>
+            <a:spLocks noGrp="1" noRot="1" noChangeAspect="1"/>
+          </p:cNvSpPr>
+          <p:nvPr>
+            <p:ph type="sldImg"/>
+          </p:nvPr>
+        </p:nvSpPr>
+        <p:spPr/>
+      </p:sp>
+      <p:sp>
+        <p:nvSpPr>
+          <p:cNvPr id="3" name="Notes Placeholder 2"/>
+          <p:cNvSpPr>
+            <a:spLocks noGrp="1"/>
+          </p:cNvSpPr>
+          <p:nvPr>
+            <p:ph type="body" idx="1"/>
+          </p:nvPr>
+        </p:nvSpPr>
+        <p:spPr/>
+        <p:txBody>
+          <a:bodyPr/>
+          <a:lstStyle/>
+          <a:p>
+            <a:endParaRPr lang="en-US"/>
+          </a:p>
+        </p:txBody>
+      </p:sp>
+      <p:sp>
+        <p:nvSpPr>
+          <p:cNvPr id="4" name="Slide Number Placeholder 3"/>
+          <p:cNvSpPr>
+            <a:spLocks noGrp="1"/>
+          </p:cNvSpPr>
+          <p:nvPr>
+            <p:ph type="sldNum" sz="quarter" idx="10"/>
+          </p:nvPr>
+        </p:nvSpPr>
+        <p:spPr/>
+        <p:txBody>
+          <a:bodyPr/>
+          <a:lstStyle/>
+          <a:p>
+            <a:fld id="{ABEBCB03-436C-4D8F-97DD-0E8CF3A00739}" type="slidenum">
+              <a:rPr lang="en-US" smtClean="0"/>
+              <a:t>9</a:t>
+            </a:fld>
+            <a:endParaRPr lang="en-US"/>
+          </a:p>
+        </p:txBody>
+      </p:sp>
+    </p:spTree>
+    <p:extLst>
+      <p:ext uri="{BB962C8B-B14F-4D97-AF65-F5344CB8AC3E}">
+        <p14:creationId xmlns:p14="http://schemas.microsoft.com/office/powerpoint/2010/main" val="2822291269"/>
       </p:ext>
     </p:extLst>
   </p:cSld>
@@ -1275,7 +2565,7 @@
           <a:p>
             <a:fld id="{F177A104-0C0B-4348-9A89-F5D228FCF8A6}" type="datetimeFigureOut">
               <a:rPr lang="en-US" smtClean="0"/>
-              <a:t>11/22/2017</a:t>
+              <a:t>12/1/2017</a:t>
             </a:fld>
             <a:endParaRPr lang="en-US"/>
           </a:p>
@@ -1445,7 +2735,7 @@
           <a:p>
             <a:fld id="{F177A104-0C0B-4348-9A89-F5D228FCF8A6}" type="datetimeFigureOut">
               <a:rPr lang="en-US" smtClean="0"/>
-              <a:t>11/22/2017</a:t>
+              <a:t>12/1/2017</a:t>
             </a:fld>
             <a:endParaRPr lang="en-US"/>
           </a:p>
@@ -1625,7 +2915,7 @@
           <a:p>
             <a:fld id="{F177A104-0C0B-4348-9A89-F5D228FCF8A6}" type="datetimeFigureOut">
               <a:rPr lang="en-US" smtClean="0"/>
-              <a:t>11/22/2017</a:t>
+              <a:t>12/1/2017</a:t>
             </a:fld>
             <a:endParaRPr lang="en-US"/>
           </a:p>
@@ -1795,7 +3085,7 @@
           <a:p>
             <a:fld id="{F177A104-0C0B-4348-9A89-F5D228FCF8A6}" type="datetimeFigureOut">
               <a:rPr lang="en-US" smtClean="0"/>
-              <a:t>11/22/2017</a:t>
+              <a:t>12/1/2017</a:t>
             </a:fld>
             <a:endParaRPr lang="en-US"/>
           </a:p>
@@ -2041,7 +3331,7 @@
           <a:p>
             <a:fld id="{F177A104-0C0B-4348-9A89-F5D228FCF8A6}" type="datetimeFigureOut">
               <a:rPr lang="en-US" smtClean="0"/>
-              <a:t>11/22/2017</a:t>
+              <a:t>12/1/2017</a:t>
             </a:fld>
             <a:endParaRPr lang="en-US"/>
           </a:p>
@@ -2273,7 +3563,7 @@
           <a:p>
             <a:fld id="{F177A104-0C0B-4348-9A89-F5D228FCF8A6}" type="datetimeFigureOut">
               <a:rPr lang="en-US" smtClean="0"/>
-              <a:t>11/22/2017</a:t>
+              <a:t>12/1/2017</a:t>
             </a:fld>
             <a:endParaRPr lang="en-US"/>
           </a:p>
@@ -2640,7 +3930,7 @@
           <a:p>
             <a:fld id="{F177A104-0C0B-4348-9A89-F5D228FCF8A6}" type="datetimeFigureOut">
               <a:rPr lang="en-US" smtClean="0"/>
-              <a:t>11/22/2017</a:t>
+              <a:t>12/1/2017</a:t>
             </a:fld>
             <a:endParaRPr lang="en-US"/>
           </a:p>
@@ -2758,7 +4048,7 @@
           <a:p>
             <a:fld id="{F177A104-0C0B-4348-9A89-F5D228FCF8A6}" type="datetimeFigureOut">
               <a:rPr lang="en-US" smtClean="0"/>
-              <a:t>11/22/2017</a:t>
+              <a:t>12/1/2017</a:t>
             </a:fld>
             <a:endParaRPr lang="en-US"/>
           </a:p>
@@ -2853,7 +4143,7 @@
           <a:p>
             <a:fld id="{F177A104-0C0B-4348-9A89-F5D228FCF8A6}" type="datetimeFigureOut">
               <a:rPr lang="en-US" smtClean="0"/>
-              <a:t>11/22/2017</a:t>
+              <a:t>12/1/2017</a:t>
             </a:fld>
             <a:endParaRPr lang="en-US"/>
           </a:p>
@@ -3130,7 +4420,7 @@
           <a:p>
             <a:fld id="{F177A104-0C0B-4348-9A89-F5D228FCF8A6}" type="datetimeFigureOut">
               <a:rPr lang="en-US" smtClean="0"/>
-              <a:t>11/22/2017</a:t>
+              <a:t>12/1/2017</a:t>
             </a:fld>
             <a:endParaRPr lang="en-US"/>
           </a:p>
@@ -3383,7 +4673,7 @@
           <a:p>
             <a:fld id="{F177A104-0C0B-4348-9A89-F5D228FCF8A6}" type="datetimeFigureOut">
               <a:rPr lang="en-US" smtClean="0"/>
-              <a:t>11/22/2017</a:t>
+              <a:t>12/1/2017</a:t>
             </a:fld>
             <a:endParaRPr lang="en-US"/>
           </a:p>
@@ -3596,7 +4886,7 @@
           <a:p>
             <a:fld id="{F177A104-0C0B-4348-9A89-F5D228FCF8A6}" type="datetimeFigureOut">
               <a:rPr lang="en-US" smtClean="0"/>
-              <a:t>11/22/2017</a:t>
+              <a:t>12/1/2017</a:t>
             </a:fld>
             <a:endParaRPr lang="en-US"/>
           </a:p>
@@ -4082,6 +5372,166 @@
       </p:par>
     </p:tnLst>
   </p:timing>
+</p:sld>
+</file>
+
+<file path=ppt/slides/slide10.xml><?xml version="1.0" encoding="utf-8"?>
+<p:sld xmlns:a="http://schemas.openxmlformats.org/drawingml/2006/main" xmlns:r="http://schemas.openxmlformats.org/officeDocument/2006/relationships" xmlns:p="http://schemas.openxmlformats.org/presentationml/2006/main">
+  <p:cSld>
+    <p:spTree>
+      <p:nvGrpSpPr>
+        <p:cNvPr id="1" name=""/>
+        <p:cNvGrpSpPr/>
+        <p:nvPr/>
+      </p:nvGrpSpPr>
+      <p:grpSpPr>
+        <a:xfrm>
+          <a:off x="0" y="0"/>
+          <a:ext cx="0" cy="0"/>
+          <a:chOff x="0" y="0"/>
+          <a:chExt cx="0" cy="0"/>
+        </a:xfrm>
+      </p:grpSpPr>
+      <p:sp>
+        <p:nvSpPr>
+          <p:cNvPr id="2" name="Title 1"/>
+          <p:cNvSpPr>
+            <a:spLocks noGrp="1"/>
+          </p:cNvSpPr>
+          <p:nvPr>
+            <p:ph type="title"/>
+          </p:nvPr>
+        </p:nvSpPr>
+        <p:spPr/>
+        <p:txBody>
+          <a:bodyPr/>
+          <a:lstStyle/>
+          <a:p>
+            <a:r>
+              <a:rPr lang="en-US" dirty="0"/>
+              <a:t>Task B CNTK – Project Plan Week of 12/04</a:t>
+            </a:r>
+          </a:p>
+        </p:txBody>
+      </p:sp>
+      <p:sp>
+        <p:nvSpPr>
+          <p:cNvPr id="3" name="Content Placeholder 2"/>
+          <p:cNvSpPr>
+            <a:spLocks noGrp="1"/>
+          </p:cNvSpPr>
+          <p:nvPr>
+            <p:ph idx="1"/>
+          </p:nvPr>
+        </p:nvSpPr>
+        <p:spPr/>
+        <p:txBody>
+          <a:bodyPr>
+            <a:normAutofit/>
+          </a:bodyPr>
+          <a:lstStyle/>
+          <a:p>
+            <a:r>
+              <a:rPr lang="en-US" dirty="0"/>
+              <a:t>Downloading 2</a:t>
+            </a:r>
+            <a:r>
+              <a:rPr lang="en-US" baseline="30000" dirty="0"/>
+              <a:t>nd</a:t>
+            </a:r>
+            <a:r>
+              <a:rPr lang="en-US" dirty="0"/>
+              <a:t> bath of pictures</a:t>
+            </a:r>
+          </a:p>
+          <a:p>
+            <a:r>
+              <a:rPr lang="en-US" dirty="0"/>
+              <a:t>Integration with other team?</a:t>
+            </a:r>
+          </a:p>
+          <a:p>
+            <a:r>
+              <a:rPr lang="en-US" dirty="0"/>
+              <a:t>Testing pretrained model with different scenarios</a:t>
+            </a:r>
+          </a:p>
+          <a:p>
+            <a:pPr lvl="1"/>
+            <a:r>
+              <a:rPr lang="en-US" dirty="0"/>
+              <a:t>Empty – Non-empty detection</a:t>
+            </a:r>
+          </a:p>
+          <a:p>
+            <a:pPr lvl="1"/>
+            <a:r>
+              <a:rPr lang="en-US" dirty="0"/>
+              <a:t>Using balance dataset</a:t>
+            </a:r>
+          </a:p>
+          <a:p>
+            <a:pPr lvl="1"/>
+            <a:r>
+              <a:rPr lang="en-US" dirty="0"/>
+              <a:t>Different model</a:t>
+            </a:r>
+          </a:p>
+          <a:p>
+            <a:pPr lvl="1"/>
+            <a:r>
+              <a:rPr lang="en-US" dirty="0"/>
+              <a:t>Different size</a:t>
+            </a:r>
+          </a:p>
+          <a:p>
+            <a:r>
+              <a:rPr lang="en-US" dirty="0"/>
+              <a:t>Figure out if pre-trained model could be running on CPU?</a:t>
+            </a:r>
+          </a:p>
+          <a:p>
+            <a:pPr lvl="1"/>
+            <a:r>
+              <a:rPr lang="en-US" dirty="0"/>
+              <a:t>Otherwise we need $ GPU card for this project</a:t>
+            </a:r>
+          </a:p>
+          <a:p>
+            <a:pPr lvl="1"/>
+            <a:endParaRPr lang="en-US" dirty="0"/>
+          </a:p>
+          <a:p>
+            <a:pPr lvl="2"/>
+            <a:endParaRPr lang="en-US" dirty="0"/>
+          </a:p>
+          <a:p>
+            <a:pPr lvl="2"/>
+            <a:endParaRPr lang="en-US" dirty="0"/>
+          </a:p>
+          <a:p>
+            <a:endParaRPr lang="en-US" dirty="0"/>
+          </a:p>
+          <a:p>
+            <a:pPr lvl="1"/>
+            <a:endParaRPr lang="en-US" dirty="0"/>
+          </a:p>
+          <a:p>
+            <a:pPr lvl="1"/>
+            <a:endParaRPr lang="en-US" dirty="0"/>
+          </a:p>
+        </p:txBody>
+      </p:sp>
+    </p:spTree>
+    <p:extLst>
+      <p:ext uri="{BB962C8B-B14F-4D97-AF65-F5344CB8AC3E}">
+        <p14:creationId xmlns:p14="http://schemas.microsoft.com/office/powerpoint/2010/main" val="2820432691"/>
+      </p:ext>
+    </p:extLst>
+  </p:cSld>
+  <p:clrMapOvr>
+    <a:masterClrMapping/>
+  </p:clrMapOvr>
 </p:sld>
 </file>
 
@@ -4526,89 +5976,185 @@
           <a:lstStyle/>
           <a:p>
             <a:r>
-              <a:rPr lang="en-US" dirty="0" smtClean="0"/>
+              <a:rPr lang="en-US" dirty="0"/>
               <a:t>Task B CNTK – Project Status 2017/12/01</a:t>
             </a:r>
+          </a:p>
+        </p:txBody>
+      </p:sp>
+      <p:sp>
+        <p:nvSpPr>
+          <p:cNvPr id="3" name="Content Placeholder 2"/>
+          <p:cNvSpPr>
+            <a:spLocks noGrp="1"/>
+          </p:cNvSpPr>
+          <p:nvPr>
+            <p:ph idx="1"/>
+          </p:nvPr>
+        </p:nvSpPr>
+        <p:spPr/>
+        <p:txBody>
+          <a:bodyPr>
+            <a:normAutofit fontScale="92500" lnSpcReduction="20000"/>
+          </a:bodyPr>
+          <a:lstStyle/>
+          <a:p>
+            <a:r>
+              <a:rPr lang="en-US" dirty="0"/>
+              <a:t>GitHub project is setup for Task B Team</a:t>
+            </a:r>
+          </a:p>
+          <a:p>
+            <a:pPr lvl="1"/>
+            <a:r>
+              <a:rPr lang="en-US" b="1" dirty="0" err="1">
+                <a:hlinkClick r:id="rId3"/>
+              </a:rPr>
+              <a:t>tncchina</a:t>
+            </a:r>
+            <a:r>
+              <a:rPr lang="en-US" b="1" dirty="0"/>
+              <a:t>/</a:t>
+            </a:r>
+            <a:r>
+              <a:rPr lang="en-US" b="1" dirty="0" err="1">
+                <a:hlinkClick r:id="rId4"/>
+              </a:rPr>
+              <a:t>AnimalLabel</a:t>
+            </a:r>
+            <a:r>
+              <a:rPr lang="en-US" b="1" dirty="0"/>
+              <a:t> </a:t>
+            </a:r>
+          </a:p>
+          <a:p>
+            <a:pPr lvl="1"/>
+            <a:r>
+              <a:rPr lang="en-US" b="1" dirty="0"/>
+              <a:t>2 forked branches</a:t>
+            </a:r>
+          </a:p>
+          <a:p>
+            <a:pPr lvl="1"/>
+            <a:r>
+              <a:rPr lang="en-US" b="1" dirty="0"/>
+              <a:t>Setup monitor service to notify the change in main branch</a:t>
+            </a:r>
             <a:endParaRPr lang="en-US" dirty="0"/>
           </a:p>
-        </p:txBody>
-      </p:sp>
-      <p:sp>
-        <p:nvSpPr>
-          <p:cNvPr id="3" name="Content Placeholder 2"/>
-          <p:cNvSpPr>
-            <a:spLocks noGrp="1"/>
-          </p:cNvSpPr>
-          <p:nvPr>
-            <p:ph idx="1"/>
-          </p:nvPr>
-        </p:nvSpPr>
-        <p:spPr/>
-        <p:txBody>
-          <a:bodyPr>
-            <a:normAutofit/>
-          </a:bodyPr>
-          <a:lstStyle/>
-          <a:p>
-            <a:r>
-              <a:rPr lang="en-US" dirty="0" smtClean="0"/>
-              <a:t>Data Preprocessing</a:t>
+          <a:p>
+            <a:r>
+              <a:rPr lang="en-US" dirty="0"/>
+              <a:t>First batch of picture is ready</a:t>
             </a:r>
           </a:p>
           <a:p>
             <a:pPr lvl="1"/>
             <a:r>
-              <a:rPr lang="en-US" dirty="0" smtClean="0"/>
-              <a:t>Place Holder</a:t>
-            </a:r>
-          </a:p>
-          <a:p>
-            <a:r>
-              <a:rPr lang="en-US" dirty="0" smtClean="0"/>
-              <a:t>Place holder</a:t>
+              <a:rPr lang="en-US" dirty="0"/>
+              <a:t>3257 pictures</a:t>
             </a:r>
           </a:p>
           <a:p>
             <a:pPr lvl="1"/>
             <a:r>
-              <a:rPr lang="en-US" dirty="0" smtClean="0"/>
-              <a:t>Place holder</a:t>
+              <a:rPr lang="en-US" dirty="0"/>
+              <a:t>890 video clips</a:t>
+            </a:r>
+          </a:p>
+          <a:p>
+            <a:r>
+              <a:rPr lang="en-US" dirty="0"/>
+              <a:t>Developed a tool to resize images</a:t>
+            </a:r>
+          </a:p>
+          <a:p>
+            <a:pPr lvl="1"/>
+            <a:r>
+              <a:rPr lang="en-US" dirty="0"/>
+              <a:t>OpenCV-Python</a:t>
+            </a:r>
+          </a:p>
+          <a:p>
+            <a:pPr lvl="1"/>
+            <a:r>
+              <a:rPr lang="en-US" dirty="0"/>
+              <a:t>Resized to customized size</a:t>
+            </a:r>
+          </a:p>
+          <a:p>
+            <a:pPr lvl="1"/>
+            <a:r>
+              <a:rPr lang="en-US" dirty="0"/>
+              <a:t>Batch process (support sub-folders)</a:t>
+            </a:r>
+          </a:p>
+          <a:p>
+            <a:r>
+              <a:rPr lang="en-US" dirty="0"/>
+              <a:t>Transfer-Learning Experiments </a:t>
             </a:r>
           </a:p>
           <a:p>
             <a:pPr lvl="2"/>
-            <a:endParaRPr lang="en-US" dirty="0" smtClean="0"/>
-          </a:p>
-          <a:p>
-            <a:endParaRPr lang="en-US" dirty="0" smtClean="0"/>
-          </a:p>
-          <a:p>
-            <a:pPr lvl="1"/>
-            <a:endParaRPr lang="en-US" dirty="0" smtClean="0"/>
+            <a:r>
+              <a:rPr lang="en-US" dirty="0"/>
+              <a:t>(Details in next slide)</a:t>
+            </a:r>
+          </a:p>
+          <a:p>
+            <a:endParaRPr lang="en-US" dirty="0"/>
           </a:p>
           <a:p>
             <a:pPr lvl="1"/>
             <a:endParaRPr lang="en-US" dirty="0"/>
           </a:p>
-        </p:txBody>
-      </p:sp>
+          <a:p>
+            <a:pPr lvl="1"/>
+            <a:endParaRPr lang="en-US" dirty="0"/>
+          </a:p>
+        </p:txBody>
+      </p:sp>
+      <p:pic>
+        <p:nvPicPr>
+          <p:cNvPr id="4" name="Picture 3">
+            <a:extLst>
+              <a:ext uri="{FF2B5EF4-FFF2-40B4-BE49-F238E27FC236}">
+                <a16:creationId xmlns:a16="http://schemas.microsoft.com/office/drawing/2014/main" id="{95A03EA5-4343-495C-8C9B-C39769B24518}"/>
+              </a:ext>
+            </a:extLst>
+          </p:cNvPr>
+          <p:cNvPicPr>
+            <a:picLocks noChangeAspect="1"/>
+          </p:cNvPicPr>
+          <p:nvPr/>
+        </p:nvPicPr>
+        <p:blipFill>
+          <a:blip r:embed="rId5"/>
+          <a:stretch>
+            <a:fillRect/>
+          </a:stretch>
+        </p:blipFill>
+        <p:spPr>
+          <a:xfrm>
+            <a:off x="6987609" y="4001294"/>
+            <a:ext cx="4826829" cy="1999901"/>
+          </a:xfrm>
+          <a:prstGeom prst="rect">
+            <a:avLst/>
+          </a:prstGeom>
+        </p:spPr>
+      </p:pic>
     </p:spTree>
     <p:extLst>
       <p:ext uri="{BB962C8B-B14F-4D97-AF65-F5344CB8AC3E}">
-        <p14:creationId xmlns:p14="http://schemas.microsoft.com/office/powerpoint/2010/main" val="2659731368"/>
+        <p14:creationId xmlns:p14="http://schemas.microsoft.com/office/powerpoint/2010/main" val="1770391024"/>
       </p:ext>
     </p:extLst>
   </p:cSld>
   <p:clrMapOvr>
     <a:masterClrMapping/>
   </p:clrMapOvr>
-  <p:timing>
-    <p:tnLst>
-      <p:par>
-        <p:cTn id="1" dur="indefinite" restart="never" nodeType="tmRoot"/>
-      </p:par>
-    </p:tnLst>
-  </p:timing>
 </p:sld>
 </file>
 
@@ -4631,6 +6177,169 @@
       </p:grpSpPr>
       <p:sp>
         <p:nvSpPr>
+          <p:cNvPr id="2" name="Title 1">
+            <a:extLst>
+              <a:ext uri="{FF2B5EF4-FFF2-40B4-BE49-F238E27FC236}">
+                <a16:creationId xmlns:a16="http://schemas.microsoft.com/office/drawing/2014/main" id="{C03CC730-1D1F-4265-9A3F-0FDA3489340D}"/>
+              </a:ext>
+            </a:extLst>
+          </p:cNvPr>
+          <p:cNvSpPr>
+            <a:spLocks noGrp="1"/>
+          </p:cNvSpPr>
+          <p:nvPr>
+            <p:ph type="title"/>
+          </p:nvPr>
+        </p:nvSpPr>
+        <p:spPr/>
+        <p:txBody>
+          <a:bodyPr/>
+          <a:lstStyle/>
+          <a:p>
+            <a:r>
+              <a:rPr lang="en-US" dirty="0"/>
+              <a:t>Transfer-Learning Experiments</a:t>
+            </a:r>
+          </a:p>
+        </p:txBody>
+      </p:sp>
+      <p:sp>
+        <p:nvSpPr>
+          <p:cNvPr id="3" name="Content Placeholder 2">
+            <a:extLst>
+              <a:ext uri="{FF2B5EF4-FFF2-40B4-BE49-F238E27FC236}">
+                <a16:creationId xmlns:a16="http://schemas.microsoft.com/office/drawing/2014/main" id="{8AF1D238-AF75-43FC-BC95-B26FCEA8A062}"/>
+              </a:ext>
+            </a:extLst>
+          </p:cNvPr>
+          <p:cNvSpPr>
+            <a:spLocks noGrp="1"/>
+          </p:cNvSpPr>
+          <p:nvPr>
+            <p:ph idx="1"/>
+          </p:nvPr>
+        </p:nvSpPr>
+        <p:spPr/>
+        <p:txBody>
+          <a:bodyPr>
+            <a:normAutofit lnSpcReduction="10000"/>
+          </a:bodyPr>
+          <a:lstStyle/>
+          <a:p>
+            <a:r>
+              <a:rPr lang="en-US" dirty="0"/>
+              <a:t>Comparing the correction rate between two ImageNet pre-trained models</a:t>
+            </a:r>
+          </a:p>
+          <a:p>
+            <a:pPr lvl="1"/>
+            <a:r>
+              <a:rPr lang="en-US" dirty="0"/>
+              <a:t>ResNet18_ImageNet_CNTK</a:t>
+            </a:r>
+          </a:p>
+          <a:p>
+            <a:pPr lvl="1"/>
+            <a:r>
+              <a:rPr lang="en-US" dirty="0"/>
+              <a:t>ResNet152_ImageNet_CNTK</a:t>
+            </a:r>
+          </a:p>
+          <a:p>
+            <a:r>
+              <a:rPr lang="en-US" dirty="0"/>
+              <a:t>1620 pictures (682x512) as training data</a:t>
+            </a:r>
+          </a:p>
+          <a:p>
+            <a:r>
+              <a:rPr lang="en-US" dirty="0"/>
+              <a:t>700 pictures as test data</a:t>
+            </a:r>
+          </a:p>
+          <a:p>
+            <a:r>
+              <a:rPr lang="en-US" dirty="0"/>
+              <a:t>Repeated entire training set with same parameters</a:t>
+            </a:r>
+          </a:p>
+          <a:p>
+            <a:pPr lvl="1"/>
+            <a:r>
+              <a:rPr lang="en-US" dirty="0" err="1"/>
+              <a:t>mb_size</a:t>
+            </a:r>
+            <a:r>
+              <a:rPr lang="en-US" dirty="0"/>
+              <a:t> = 5</a:t>
+            </a:r>
+          </a:p>
+          <a:p>
+            <a:pPr lvl="1"/>
+            <a:r>
+              <a:rPr lang="en-US" dirty="0" err="1"/>
+              <a:t>lr_per_mb</a:t>
+            </a:r>
+            <a:r>
+              <a:rPr lang="en-US" dirty="0"/>
+              <a:t> = [0.2]*10 + [0.1]</a:t>
+            </a:r>
+          </a:p>
+          <a:p>
+            <a:pPr lvl="1"/>
+            <a:r>
+              <a:rPr lang="en-US" dirty="0" err="1"/>
+              <a:t>momentum_per_mb</a:t>
+            </a:r>
+            <a:r>
+              <a:rPr lang="en-US" dirty="0"/>
+              <a:t> = 0.9</a:t>
+            </a:r>
+          </a:p>
+          <a:p>
+            <a:pPr lvl="1"/>
+            <a:r>
+              <a:rPr lang="en-US" dirty="0"/>
+              <a:t>l2_reg_weight = 0.0005</a:t>
+            </a:r>
+          </a:p>
+          <a:p>
+            <a:endParaRPr lang="en-US" dirty="0"/>
+          </a:p>
+        </p:txBody>
+      </p:sp>
+    </p:spTree>
+    <p:extLst>
+      <p:ext uri="{BB962C8B-B14F-4D97-AF65-F5344CB8AC3E}">
+        <p14:creationId xmlns:p14="http://schemas.microsoft.com/office/powerpoint/2010/main" val="2194538816"/>
+      </p:ext>
+    </p:extLst>
+  </p:cSld>
+  <p:clrMapOvr>
+    <a:masterClrMapping/>
+  </p:clrMapOvr>
+</p:sld>
+</file>
+
+<file path=ppt/slides/slide5.xml><?xml version="1.0" encoding="utf-8"?>
+<p:sld xmlns:a="http://schemas.openxmlformats.org/drawingml/2006/main" xmlns:r="http://schemas.openxmlformats.org/officeDocument/2006/relationships" xmlns:p="http://schemas.openxmlformats.org/presentationml/2006/main">
+  <p:cSld>
+    <p:spTree>
+      <p:nvGrpSpPr>
+        <p:cNvPr id="1" name=""/>
+        <p:cNvGrpSpPr/>
+        <p:nvPr/>
+      </p:nvGrpSpPr>
+      <p:grpSpPr>
+        <a:xfrm>
+          <a:off x="0" y="0"/>
+          <a:ext cx="0" cy="0"/>
+          <a:chOff x="0" y="0"/>
+          <a:chExt cx="0" cy="0"/>
+        </a:xfrm>
+      </p:grpSpPr>
+      <p:sp>
+        <p:nvSpPr>
           <p:cNvPr id="2" name="Title 1"/>
           <p:cNvSpPr>
             <a:spLocks noGrp="1"/>
@@ -4852,7 +6561,7 @@
 </p:sld>
 </file>
 
-<file path=ppt/slides/slide5.xml><?xml version="1.0" encoding="utf-8"?>
+<file path=ppt/slides/slide6.xml><?xml version="1.0" encoding="utf-8"?>
 <p:sld xmlns:a="http://schemas.openxmlformats.org/drawingml/2006/main" xmlns:r="http://schemas.openxmlformats.org/officeDocument/2006/relationships" xmlns:p="http://schemas.openxmlformats.org/presentationml/2006/main">
   <p:cSld>
     <p:spTree>
@@ -5026,7 +6735,64 @@
 </p:sld>
 </file>
 
-<file path=ppt/slides/slide6.xml><?xml version="1.0" encoding="utf-8"?>
+<file path=ppt/slides/slide7.xml><?xml version="1.0" encoding="utf-8"?>
+<p:sld xmlns:a="http://schemas.openxmlformats.org/drawingml/2006/main" xmlns:r="http://schemas.openxmlformats.org/officeDocument/2006/relationships" xmlns:p="http://schemas.openxmlformats.org/presentationml/2006/main">
+  <p:cSld>
+    <p:spTree>
+      <p:nvGrpSpPr>
+        <p:cNvPr id="1" name=""/>
+        <p:cNvGrpSpPr/>
+        <p:nvPr/>
+      </p:nvGrpSpPr>
+      <p:grpSpPr>
+        <a:xfrm>
+          <a:off x="0" y="0"/>
+          <a:ext cx="0" cy="0"/>
+          <a:chOff x="0" y="0"/>
+          <a:chExt cx="0" cy="0"/>
+        </a:xfrm>
+      </p:grpSpPr>
+      <p:graphicFrame>
+        <p:nvGraphicFramePr>
+          <p:cNvPr id="4" name="Content Placeholder 3">
+            <a:extLst>
+              <a:ext uri="{FF2B5EF4-FFF2-40B4-BE49-F238E27FC236}">
+                <a16:creationId xmlns:a16="http://schemas.microsoft.com/office/drawing/2014/main" id="{32304ADB-A1A4-4361-91DA-04B96AC0D144}"/>
+              </a:ext>
+            </a:extLst>
+          </p:cNvPr>
+          <p:cNvGraphicFramePr>
+            <a:graphicFrameLocks noGrp="1"/>
+          </p:cNvGraphicFramePr>
+          <p:nvPr>
+            <p:ph idx="4294967295"/>
+            <p:extLst/>
+          </p:nvPr>
+        </p:nvGraphicFramePr>
+        <p:xfrm>
+          <a:off x="0" y="1146875"/>
+          <a:ext cx="11980190" cy="5030088"/>
+        </p:xfrm>
+        <a:graphic>
+          <a:graphicData uri="http://schemas.openxmlformats.org/drawingml/2006/chart">
+            <c:chart xmlns:c="http://schemas.openxmlformats.org/drawingml/2006/chart" xmlns:r="http://schemas.openxmlformats.org/officeDocument/2006/relationships" r:id="rId3"/>
+          </a:graphicData>
+        </a:graphic>
+      </p:graphicFrame>
+    </p:spTree>
+    <p:extLst>
+      <p:ext uri="{BB962C8B-B14F-4D97-AF65-F5344CB8AC3E}">
+        <p14:creationId xmlns:p14="http://schemas.microsoft.com/office/powerpoint/2010/main" val="2325571133"/>
+      </p:ext>
+    </p:extLst>
+  </p:cSld>
+  <p:clrMapOvr>
+    <a:masterClrMapping/>
+  </p:clrMapOvr>
+</p:sld>
+</file>
+
+<file path=ppt/slides/slide8.xml><?xml version="1.0" encoding="utf-8"?>
 <p:sld xmlns:a="http://schemas.openxmlformats.org/drawingml/2006/main" xmlns:r="http://schemas.openxmlformats.org/officeDocument/2006/relationships" xmlns:p="http://schemas.openxmlformats.org/presentationml/2006/main">
   <p:cSld>
     <p:spTree>
@@ -5231,7 +6997,7 @@
 </p:sld>
 </file>
 
-<file path=ppt/slides/slide7.xml><?xml version="1.0" encoding="utf-8"?>
+<file path=ppt/slides/slide9.xml><?xml version="1.0" encoding="utf-8"?>
 <p:sld xmlns:a="http://schemas.openxmlformats.org/drawingml/2006/main" xmlns:r="http://schemas.openxmlformats.org/officeDocument/2006/relationships" xmlns:p="http://schemas.openxmlformats.org/presentationml/2006/main">
   <p:cSld>
     <p:spTree>
@@ -5376,133 +7142,6 @@
     <p:extLst>
       <p:ext uri="{BB962C8B-B14F-4D97-AF65-F5344CB8AC3E}">
         <p14:creationId xmlns:p14="http://schemas.microsoft.com/office/powerpoint/2010/main" val="331550904"/>
-      </p:ext>
-    </p:extLst>
-  </p:cSld>
-  <p:clrMapOvr>
-    <a:masterClrMapping/>
-  </p:clrMapOvr>
-  <p:timing>
-    <p:tnLst>
-      <p:par>
-        <p:cTn id="1" dur="indefinite" restart="never" nodeType="tmRoot"/>
-      </p:par>
-    </p:tnLst>
-  </p:timing>
-</p:sld>
-</file>
-
-<file path=ppt/slides/slide8.xml><?xml version="1.0" encoding="utf-8"?>
-<p:sld xmlns:a="http://schemas.openxmlformats.org/drawingml/2006/main" xmlns:r="http://schemas.openxmlformats.org/officeDocument/2006/relationships" xmlns:p="http://schemas.openxmlformats.org/presentationml/2006/main">
-  <p:cSld>
-    <p:spTree>
-      <p:nvGrpSpPr>
-        <p:cNvPr id="1" name=""/>
-        <p:cNvGrpSpPr/>
-        <p:nvPr/>
-      </p:nvGrpSpPr>
-      <p:grpSpPr>
-        <a:xfrm>
-          <a:off x="0" y="0"/>
-          <a:ext cx="0" cy="0"/>
-          <a:chOff x="0" y="0"/>
-          <a:chExt cx="0" cy="0"/>
-        </a:xfrm>
-      </p:grpSpPr>
-      <p:sp>
-        <p:nvSpPr>
-          <p:cNvPr id="2" name="Title 1"/>
-          <p:cNvSpPr>
-            <a:spLocks noGrp="1"/>
-          </p:cNvSpPr>
-          <p:nvPr>
-            <p:ph type="title"/>
-          </p:nvPr>
-        </p:nvSpPr>
-        <p:spPr/>
-        <p:txBody>
-          <a:bodyPr/>
-          <a:lstStyle/>
-          <a:p>
-            <a:r>
-              <a:rPr lang="en-US" dirty="0" smtClean="0"/>
-              <a:t>Task B CNTK – Project Plan Week of 12/04</a:t>
-            </a:r>
-            <a:endParaRPr lang="en-US" dirty="0"/>
-          </a:p>
-        </p:txBody>
-      </p:sp>
-      <p:sp>
-        <p:nvSpPr>
-          <p:cNvPr id="3" name="Content Placeholder 2"/>
-          <p:cNvSpPr>
-            <a:spLocks noGrp="1"/>
-          </p:cNvSpPr>
-          <p:nvPr>
-            <p:ph idx="1"/>
-          </p:nvPr>
-        </p:nvSpPr>
-        <p:spPr/>
-        <p:txBody>
-          <a:bodyPr>
-            <a:normAutofit/>
-          </a:bodyPr>
-          <a:lstStyle/>
-          <a:p>
-            <a:r>
-              <a:rPr lang="en-US" dirty="0" smtClean="0"/>
-              <a:t>Place holder</a:t>
-            </a:r>
-          </a:p>
-          <a:p>
-            <a:pPr lvl="1"/>
-            <a:r>
-              <a:rPr lang="en-US" dirty="0" smtClean="0"/>
-              <a:t>Place holder</a:t>
-            </a:r>
-          </a:p>
-          <a:p>
-            <a:r>
-              <a:rPr lang="en-US" dirty="0" smtClean="0"/>
-              <a:t>Place holder</a:t>
-            </a:r>
-          </a:p>
-          <a:p>
-            <a:pPr lvl="1"/>
-            <a:r>
-              <a:rPr lang="en-US" dirty="0" smtClean="0"/>
-              <a:t>Place holder</a:t>
-            </a:r>
-          </a:p>
-          <a:p>
-            <a:pPr lvl="1"/>
-            <a:endParaRPr lang="en-US" dirty="0" smtClean="0"/>
-          </a:p>
-          <a:p>
-            <a:pPr lvl="2"/>
-            <a:endParaRPr lang="en-US" dirty="0" smtClean="0"/>
-          </a:p>
-          <a:p>
-            <a:pPr lvl="2"/>
-            <a:endParaRPr lang="en-US" dirty="0" smtClean="0"/>
-          </a:p>
-          <a:p>
-            <a:endParaRPr lang="en-US" dirty="0" smtClean="0"/>
-          </a:p>
-          <a:p>
-            <a:pPr lvl="1"/>
-            <a:endParaRPr lang="en-US" dirty="0" smtClean="0"/>
-          </a:p>
-          <a:p>
-            <a:pPr lvl="1"/>
-            <a:endParaRPr lang="en-US" dirty="0"/>
-          </a:p>
-        </p:txBody>
-      </p:sp>
-    </p:spTree>
-    <p:extLst>
-      <p:ext uri="{BB962C8B-B14F-4D97-AF65-F5344CB8AC3E}">
-        <p14:creationId xmlns:p14="http://schemas.microsoft.com/office/powerpoint/2010/main" val="2179754760"/>
       </p:ext>
     </p:extLst>
   </p:cSld>

</xml_diff>